<commit_message>
upd bash first lec
</commit_message>
<xml_diff>
--- a/3 лекция/Баш продолжение.pptx
+++ b/3 лекция/Баш продолжение.pptx
@@ -5,10 +5,14 @@
     <p:sldMasterId id="2147483648" r:id="rId1"/>
   </p:sldMasterIdLst>
   <p:notesMasterIdLst>
-    <p:notesMasterId r:id="rId5"/>
+    <p:notesMasterId r:id="rId9"/>
   </p:notesMasterIdLst>
   <p:sldIdLst>
     <p:sldId id="256" r:id="rId4"/>
+    <p:sldId id="257" r:id="rId5"/>
+    <p:sldId id="258" r:id="rId6"/>
+    <p:sldId id="259" r:id="rId7"/>
+    <p:sldId id="260" r:id="rId8"/>
   </p:sldIdLst>
   <p:sldSz cx="12192000" cy="6858000"/>
   <p:notesSz cx="6858000" cy="9144000"/>
@@ -566,6 +570,334 @@
               <a:t>1</a:t>
             </a:fld>
             <a:endParaRPr lang="en-US"/>
+          </a:p>
+        </p:txBody>
+      </p:sp>
+    </p:spTree>
+  </p:cSld>
+</p:notes>
+</file>
+
+<file path=ppt/notesSlides/notesSlide2.xml><?xml version="1.0" encoding="utf-8"?>
+<p:notes xmlns:a="http://schemas.openxmlformats.org/drawingml/2006/main" xmlns:r="http://schemas.openxmlformats.org/officeDocument/2006/relationships" xmlns:p="http://schemas.openxmlformats.org/presentationml/2006/main" xmlns:m="http://schemas.openxmlformats.org/officeDocument/2006/math" xmlns:w="http://schemas.openxmlformats.org/wordprocessingml/2006/main">
+  <p:cSld name="">
+    <p:spTree>
+      <p:nvGrpSpPr>
+        <p:cNvPr id="1" name=""/>
+        <p:cNvGrpSpPr/>
+        <p:nvPr/>
+      </p:nvGrpSpPr>
+      <p:grpSpPr bwMode="auto">
+        <a:xfrm>
+          <a:off x="0" y="0"/>
+          <a:ext cx="0" cy="0"/>
+          <a:chOff x="0" y="0"/>
+          <a:chExt cx="0" cy="0"/>
+        </a:xfrm>
+      </p:grpSpPr>
+      <p:sp>
+        <p:nvSpPr>
+          <p:cNvPr id="1560767501" name="Slide Image Placeholder 1"/>
+          <p:cNvSpPr>
+            <a:spLocks noChangeAspect="1" noGrp="1" noRot="1"/>
+          </p:cNvSpPr>
+          <p:nvPr>
+            <p:ph type="sldImg"/>
+          </p:nvPr>
+        </p:nvSpPr>
+        <p:spPr bwMode="auto"/>
+      </p:sp>
+      <p:sp>
+        <p:nvSpPr>
+          <p:cNvPr id="963870140" name="Notes Placeholder 2"/>
+          <p:cNvSpPr>
+            <a:spLocks noGrp="1"/>
+          </p:cNvSpPr>
+          <p:nvPr>
+            <p:ph type="body" idx="1"/>
+          </p:nvPr>
+        </p:nvSpPr>
+        <p:spPr bwMode="auto"/>
+        <p:txBody>
+          <a:bodyPr/>
+          <a:lstStyle/>
+          <a:p>
+            <a:pPr>
+              <a:defRPr/>
+            </a:pPr>
+            <a:endParaRPr/>
+          </a:p>
+        </p:txBody>
+      </p:sp>
+      <p:sp>
+        <p:nvSpPr>
+          <p:cNvPr id="1494691281" name="Slide Number Placeholder 3"/>
+          <p:cNvSpPr>
+            <a:spLocks noGrp="1"/>
+          </p:cNvSpPr>
+          <p:nvPr>
+            <p:ph type="sldNum" sz="quarter" idx="10"/>
+          </p:nvPr>
+        </p:nvSpPr>
+        <p:spPr bwMode="auto"/>
+        <p:txBody>
+          <a:bodyPr/>
+          <a:lstStyle/>
+          <a:p>
+            <a:pPr>
+              <a:defRPr/>
+            </a:pPr>
+            <a:fld id="{45FCBDEE-ECE3-8FDA-0F84-E7AD9272E929}" type="slidenum">
+              <a:rPr/>
+              <a:t/>
+            </a:fld>
+            <a:endParaRPr/>
+          </a:p>
+        </p:txBody>
+      </p:sp>
+    </p:spTree>
+  </p:cSld>
+</p:notes>
+</file>
+
+<file path=ppt/notesSlides/notesSlide3.xml><?xml version="1.0" encoding="utf-8"?>
+<p:notes xmlns:a="http://schemas.openxmlformats.org/drawingml/2006/main" xmlns:r="http://schemas.openxmlformats.org/officeDocument/2006/relationships" xmlns:p="http://schemas.openxmlformats.org/presentationml/2006/main" xmlns:m="http://schemas.openxmlformats.org/officeDocument/2006/math" xmlns:w="http://schemas.openxmlformats.org/wordprocessingml/2006/main">
+  <p:cSld name="">
+    <p:spTree>
+      <p:nvGrpSpPr>
+        <p:cNvPr id="1" name=""/>
+        <p:cNvGrpSpPr/>
+        <p:nvPr/>
+      </p:nvGrpSpPr>
+      <p:grpSpPr bwMode="auto">
+        <a:xfrm>
+          <a:off x="0" y="0"/>
+          <a:ext cx="0" cy="0"/>
+          <a:chOff x="0" y="0"/>
+          <a:chExt cx="0" cy="0"/>
+        </a:xfrm>
+      </p:grpSpPr>
+      <p:sp>
+        <p:nvSpPr>
+          <p:cNvPr id="1727356392" name="Slide Image Placeholder 1"/>
+          <p:cNvSpPr>
+            <a:spLocks noChangeAspect="1" noGrp="1" noRot="1"/>
+          </p:cNvSpPr>
+          <p:nvPr>
+            <p:ph type="sldImg"/>
+          </p:nvPr>
+        </p:nvSpPr>
+        <p:spPr bwMode="auto"/>
+      </p:sp>
+      <p:sp>
+        <p:nvSpPr>
+          <p:cNvPr id="1569164453" name="Notes Placeholder 2"/>
+          <p:cNvSpPr>
+            <a:spLocks noGrp="1"/>
+          </p:cNvSpPr>
+          <p:nvPr>
+            <p:ph type="body" idx="1"/>
+          </p:nvPr>
+        </p:nvSpPr>
+        <p:spPr bwMode="auto"/>
+        <p:txBody>
+          <a:bodyPr/>
+          <a:lstStyle/>
+          <a:p>
+            <a:pPr>
+              <a:defRPr/>
+            </a:pPr>
+            <a:endParaRPr/>
+          </a:p>
+        </p:txBody>
+      </p:sp>
+      <p:sp>
+        <p:nvSpPr>
+          <p:cNvPr id="1170403869" name="Slide Number Placeholder 3"/>
+          <p:cNvSpPr>
+            <a:spLocks noGrp="1"/>
+          </p:cNvSpPr>
+          <p:nvPr>
+            <p:ph type="sldNum" sz="quarter" idx="10"/>
+          </p:nvPr>
+        </p:nvSpPr>
+        <p:spPr bwMode="auto"/>
+        <p:txBody>
+          <a:bodyPr/>
+          <a:lstStyle/>
+          <a:p>
+            <a:pPr>
+              <a:defRPr/>
+            </a:pPr>
+            <a:fld id="{C6997470-3884-D4FB-4BBA-5FDB303FD425}" type="slidenum">
+              <a:rPr/>
+              <a:t/>
+            </a:fld>
+            <a:endParaRPr/>
+          </a:p>
+        </p:txBody>
+      </p:sp>
+    </p:spTree>
+  </p:cSld>
+</p:notes>
+</file>
+
+<file path=ppt/notesSlides/notesSlide4.xml><?xml version="1.0" encoding="utf-8"?>
+<p:notes xmlns:a="http://schemas.openxmlformats.org/drawingml/2006/main" xmlns:r="http://schemas.openxmlformats.org/officeDocument/2006/relationships" xmlns:p="http://schemas.openxmlformats.org/presentationml/2006/main" xmlns:m="http://schemas.openxmlformats.org/officeDocument/2006/math" xmlns:w="http://schemas.openxmlformats.org/wordprocessingml/2006/main">
+  <p:cSld name="">
+    <p:spTree>
+      <p:nvGrpSpPr>
+        <p:cNvPr id="1" name=""/>
+        <p:cNvGrpSpPr/>
+        <p:nvPr/>
+      </p:nvGrpSpPr>
+      <p:grpSpPr bwMode="auto">
+        <a:xfrm>
+          <a:off x="0" y="0"/>
+          <a:ext cx="0" cy="0"/>
+          <a:chOff x="0" y="0"/>
+          <a:chExt cx="0" cy="0"/>
+        </a:xfrm>
+      </p:grpSpPr>
+      <p:sp>
+        <p:nvSpPr>
+          <p:cNvPr id="790437605" name="Slide Image Placeholder 1"/>
+          <p:cNvSpPr>
+            <a:spLocks noChangeAspect="1" noGrp="1" noRot="1"/>
+          </p:cNvSpPr>
+          <p:nvPr>
+            <p:ph type="sldImg"/>
+          </p:nvPr>
+        </p:nvSpPr>
+        <p:spPr bwMode="auto"/>
+      </p:sp>
+      <p:sp>
+        <p:nvSpPr>
+          <p:cNvPr id="1546729434" name="Notes Placeholder 2"/>
+          <p:cNvSpPr>
+            <a:spLocks noGrp="1"/>
+          </p:cNvSpPr>
+          <p:nvPr>
+            <p:ph type="body" idx="1"/>
+          </p:nvPr>
+        </p:nvSpPr>
+        <p:spPr bwMode="auto"/>
+        <p:txBody>
+          <a:bodyPr/>
+          <a:lstStyle/>
+          <a:p>
+            <a:pPr>
+              <a:defRPr/>
+            </a:pPr>
+            <a:endParaRPr/>
+          </a:p>
+        </p:txBody>
+      </p:sp>
+      <p:sp>
+        <p:nvSpPr>
+          <p:cNvPr id="1816247083" name="Slide Number Placeholder 3"/>
+          <p:cNvSpPr>
+            <a:spLocks noGrp="1"/>
+          </p:cNvSpPr>
+          <p:nvPr>
+            <p:ph type="sldNum" sz="quarter" idx="10"/>
+          </p:nvPr>
+        </p:nvSpPr>
+        <p:spPr bwMode="auto"/>
+        <p:txBody>
+          <a:bodyPr/>
+          <a:lstStyle/>
+          <a:p>
+            <a:pPr>
+              <a:defRPr/>
+            </a:pPr>
+            <a:fld id="{B898564B-5751-AD95-72D0-7A1840BD4751}" type="slidenum">
+              <a:rPr/>
+              <a:t/>
+            </a:fld>
+            <a:endParaRPr/>
+          </a:p>
+        </p:txBody>
+      </p:sp>
+    </p:spTree>
+  </p:cSld>
+</p:notes>
+</file>
+
+<file path=ppt/notesSlides/notesSlide5.xml><?xml version="1.0" encoding="utf-8"?>
+<p:notes xmlns:a="http://schemas.openxmlformats.org/drawingml/2006/main" xmlns:r="http://schemas.openxmlformats.org/officeDocument/2006/relationships" xmlns:p="http://schemas.openxmlformats.org/presentationml/2006/main" xmlns:m="http://schemas.openxmlformats.org/officeDocument/2006/math" xmlns:w="http://schemas.openxmlformats.org/wordprocessingml/2006/main">
+  <p:cSld name="">
+    <p:spTree>
+      <p:nvGrpSpPr>
+        <p:cNvPr id="1" name=""/>
+        <p:cNvGrpSpPr/>
+        <p:nvPr/>
+      </p:nvGrpSpPr>
+      <p:grpSpPr bwMode="auto">
+        <a:xfrm>
+          <a:off x="0" y="0"/>
+          <a:ext cx="0" cy="0"/>
+          <a:chOff x="0" y="0"/>
+          <a:chExt cx="0" cy="0"/>
+        </a:xfrm>
+      </p:grpSpPr>
+      <p:sp>
+        <p:nvSpPr>
+          <p:cNvPr id="628653678" name="Slide Image Placeholder 1"/>
+          <p:cNvSpPr>
+            <a:spLocks noChangeAspect="1" noGrp="1" noRot="1"/>
+          </p:cNvSpPr>
+          <p:nvPr>
+            <p:ph type="sldImg"/>
+          </p:nvPr>
+        </p:nvSpPr>
+        <p:spPr bwMode="auto"/>
+      </p:sp>
+      <p:sp>
+        <p:nvSpPr>
+          <p:cNvPr id="947473483" name="Notes Placeholder 2"/>
+          <p:cNvSpPr>
+            <a:spLocks noGrp="1"/>
+          </p:cNvSpPr>
+          <p:nvPr>
+            <p:ph type="body" idx="1"/>
+          </p:nvPr>
+        </p:nvSpPr>
+        <p:spPr bwMode="auto"/>
+        <p:txBody>
+          <a:bodyPr/>
+          <a:lstStyle/>
+          <a:p>
+            <a:pPr>
+              <a:defRPr/>
+            </a:pPr>
+            <a:endParaRPr/>
+          </a:p>
+        </p:txBody>
+      </p:sp>
+      <p:sp>
+        <p:nvSpPr>
+          <p:cNvPr id="1183984374" name="Slide Number Placeholder 3"/>
+          <p:cNvSpPr>
+            <a:spLocks noGrp="1"/>
+          </p:cNvSpPr>
+          <p:nvPr>
+            <p:ph type="sldNum" sz="quarter" idx="10"/>
+          </p:nvPr>
+        </p:nvSpPr>
+        <p:spPr bwMode="auto"/>
+        <p:txBody>
+          <a:bodyPr/>
+          <a:lstStyle/>
+          <a:p>
+            <a:pPr>
+              <a:defRPr/>
+            </a:pPr>
+            <a:fld id="{48F5491C-8CFB-33B4-7CB4-23EF0B64BD15}" type="slidenum">
+              <a:rPr/>
+              <a:t/>
+            </a:fld>
+            <a:endParaRPr/>
           </a:p>
         </p:txBody>
       </p:sp>
@@ -3702,7 +4034,7 @@
         <p:spPr bwMode="auto">
           <a:xfrm flipH="0" flipV="0">
             <a:off x="9103762" y="4507190"/>
-            <a:ext cx="1564237" cy="750609"/>
+            <a:ext cx="1564236" cy="750609"/>
           </a:xfrm>
         </p:spPr>
         <p:txBody>
@@ -3717,6 +4049,1887 @@
               <a:t>P2</a:t>
             </a:r>
             <a:endParaRPr lang="en-US"/>
+          </a:p>
+        </p:txBody>
+      </p:sp>
+    </p:spTree>
+  </p:cSld>
+  <p:clrMapOvr>
+    <a:masterClrMapping/>
+  </p:clrMapOvr>
+  <mc:AlternateContent xmlns:mc="http://schemas.openxmlformats.org/markup-compatibility/2006">
+    <mc:Choice xmlns:p159="http://schemas.microsoft.com/office/powerpoint/2015/09/main" xmlns:p14="http://schemas.microsoft.com/office/powerpoint/2010/main" Requires="p159">
+      <p:transition p14:dur="2000" advClick="1"/>
+    </mc:Choice>
+    <mc:Fallback>
+      <p:transition advClick="1"/>
+    </mc:Fallback>
+  </mc:AlternateContent>
+</p:sld>
+</file>
+
+<file path=ppt/slides/slide2.xml><?xml version="1.0" encoding="utf-8"?>
+<p:sld xmlns:a="http://schemas.openxmlformats.org/drawingml/2006/main" xmlns:r="http://schemas.openxmlformats.org/officeDocument/2006/relationships" xmlns:p="http://schemas.openxmlformats.org/presentationml/2006/main" xmlns:m="http://schemas.openxmlformats.org/officeDocument/2006/math" xmlns:w="http://schemas.openxmlformats.org/wordprocessingml/2006/main" xmlns:mc="http://schemas.openxmlformats.org/markup-compatibility/2006" showMasterPhAnim="0" showMasterSp="1" show="1">
+  <p:cSld name="">
+    <p:spTree>
+      <p:nvGrpSpPr>
+        <p:cNvPr id="1" name=""/>
+        <p:cNvGrpSpPr/>
+        <p:nvPr/>
+      </p:nvGrpSpPr>
+      <p:grpSpPr bwMode="auto">
+        <a:xfrm>
+          <a:off x="0" y="0"/>
+          <a:ext cx="0" cy="0"/>
+          <a:chOff x="0" y="0"/>
+          <a:chExt cx="0" cy="0"/>
+        </a:xfrm>
+      </p:grpSpPr>
+      <p:sp>
+        <p:nvSpPr>
+          <p:cNvPr id="1161764749" name="Title 1"/>
+          <p:cNvSpPr>
+            <a:spLocks noGrp="1"/>
+          </p:cNvSpPr>
+          <p:nvPr>
+            <p:ph type="title"/>
+          </p:nvPr>
+        </p:nvSpPr>
+        <p:spPr bwMode="auto">
+          <a:xfrm flipH="0" flipV="0">
+            <a:off x="838197" y="365121"/>
+            <a:ext cx="10515600" cy="616833"/>
+          </a:xfrm>
+        </p:spPr>
+        <p:txBody>
+          <a:bodyPr vertOverflow="overflow" horzOverflow="overflow" vert="horz" wrap="square" lIns="91440" tIns="45720" rIns="91440" bIns="45720" numCol="1" spcCol="0" rtlCol="0" fromWordArt="0" anchor="ctr" anchorCtr="0" forceAA="0" upright="0" compatLnSpc="0">
+            <a:normAutofit/>
+          </a:bodyPr>
+          <a:lstStyle/>
+          <a:p>
+            <a:pPr>
+              <a:defRPr/>
+            </a:pPr>
+            <a:r>
+              <a:rPr sz="2400"/>
+              <a:t>Скрипты: параметры командной строки</a:t>
+            </a:r>
+            <a:endParaRPr sz="2400"/>
+          </a:p>
+        </p:txBody>
+      </p:sp>
+      <p:sp>
+        <p:nvSpPr>
+          <p:cNvPr id="653115997" name="Content Placeholder 2"/>
+          <p:cNvSpPr>
+            <a:spLocks noGrp="1"/>
+          </p:cNvSpPr>
+          <p:nvPr>
+            <p:ph idx="1"/>
+          </p:nvPr>
+        </p:nvSpPr>
+        <p:spPr bwMode="auto">
+          <a:xfrm flipH="0" flipV="0">
+            <a:off x="838197" y="1109610"/>
+            <a:ext cx="10515600" cy="5371311"/>
+          </a:xfrm>
+        </p:spPr>
+        <p:txBody>
+          <a:bodyPr vertOverflow="overflow" horzOverflow="overflow" vert="horz" wrap="square" lIns="91440" tIns="45720" rIns="91440" bIns="45720" numCol="1" spcCol="0" rtlCol="0" fromWordArt="0" anchor="t" anchorCtr="0" forceAA="0" upright="0" compatLnSpc="0">
+            <a:normAutofit/>
+          </a:bodyPr>
+          <a:lstStyle/>
+          <a:p>
+            <a:pPr marL="0" indent="0">
+              <a:buFont typeface="Arial"/>
+              <a:buNone/>
+              <a:defRPr/>
+            </a:pPr>
+            <a:r>
+              <a:rPr sz="1800"/>
+              <a:t>Как вы уже могли заметить, у многих команд есть аргументы:</a:t>
+            </a:r>
+            <a:endParaRPr sz="1800"/>
+          </a:p>
+          <a:p>
+            <a:pPr marL="0" indent="0">
+              <a:buFont typeface="Arial"/>
+              <a:buNone/>
+              <a:defRPr/>
+            </a:pPr>
+            <a:r>
+              <a:rPr sz="1800"/>
+              <a:t>			cp fileName newFileName</a:t>
+            </a:r>
+            <a:br>
+              <a:rPr sz="1800"/>
+            </a:br>
+            <a:endParaRPr sz="1800"/>
+          </a:p>
+          <a:p>
+            <a:pPr marL="0" indent="0">
+              <a:buFont typeface="Arial"/>
+              <a:buNone/>
+              <a:defRPr/>
+            </a:pPr>
+            <a:r>
+              <a:rPr sz="1800"/>
+              <a:t>Скрипт тоже можно запустить с аргументами:</a:t>
+            </a:r>
+            <a:endParaRPr sz="1800"/>
+          </a:p>
+          <a:p>
+            <a:pPr marL="0" indent="0">
+              <a:buFont typeface="Arial"/>
+              <a:buNone/>
+              <a:defRPr/>
+            </a:pPr>
+            <a:r>
+              <a:rPr sz="1800"/>
+              <a:t>			./script arg1 arg2 arg3...</a:t>
+            </a:r>
+            <a:br>
+              <a:rPr sz="1800"/>
+            </a:br>
+            <a:br>
+              <a:rPr sz="1800"/>
+            </a:br>
+            <a:r>
+              <a:rPr sz="1800"/>
+              <a:t>Как получить параметры в программе:</a:t>
+            </a:r>
+            <a:endParaRPr sz="1800"/>
+          </a:p>
+          <a:p>
+            <a:pPr>
+              <a:defRPr/>
+            </a:pPr>
+            <a:r>
+              <a:rPr sz="1800"/>
+              <a:t>$0 – имя программы (./script)</a:t>
+            </a:r>
+            <a:endParaRPr sz="1800"/>
+          </a:p>
+          <a:p>
+            <a:pPr>
+              <a:defRPr/>
+            </a:pPr>
+            <a:r>
+              <a:rPr sz="1800"/>
+              <a:t>$1 - $9 – первые 9 аргументов</a:t>
+            </a:r>
+            <a:endParaRPr sz="1800"/>
+          </a:p>
+          <a:p>
+            <a:pPr>
+              <a:defRPr/>
+            </a:pPr>
+            <a:r>
+              <a:rPr sz="1800"/>
+              <a:t>${N} </a:t>
+            </a:r>
+            <a:r>
+              <a:rPr lang="ru-RU" sz="1800" b="0" i="0" u="none" strike="noStrike" cap="none" spc="0">
+                <a:solidFill>
+                  <a:schemeClr val="tx1"/>
+                </a:solidFill>
+                <a:latin typeface="Arial"/>
+                <a:ea typeface="Arial"/>
+                <a:cs typeface="Arial"/>
+              </a:rPr>
+              <a:t>– </a:t>
+            </a:r>
+            <a:r>
+              <a:rPr sz="1800"/>
+              <a:t>10 и далее аргумент (${10})</a:t>
+            </a:r>
+            <a:endParaRPr sz="1800"/>
+          </a:p>
+          <a:p>
+            <a:pPr marL="0" indent="0">
+              <a:buFont typeface="Arial"/>
+              <a:buNone/>
+              <a:defRPr/>
+            </a:pPr>
+            <a:r>
+              <a:rPr sz="1800"/>
+              <a:t>Запустим программу так: 		</a:t>
+            </a:r>
+            <a:r>
+              <a:rPr sz="1800" b="1"/>
+              <a:t>./script arg1 arg2</a:t>
+            </a:r>
+            <a:endParaRPr sz="1800"/>
+          </a:p>
+          <a:p>
+            <a:pPr marL="0" indent="0">
+              <a:buFont typeface="Arial"/>
+              <a:buNone/>
+              <a:defRPr/>
+            </a:pPr>
+            <a:r>
+              <a:rPr lang="ru-RU" sz="1800" b="0" i="0" u="none" strike="noStrike" cap="none" spc="0">
+                <a:solidFill>
+                  <a:schemeClr val="tx1"/>
+                </a:solidFill>
+                <a:latin typeface="Arial"/>
+                <a:ea typeface="Arial"/>
+                <a:cs typeface="Arial"/>
+              </a:rPr>
+              <a:t>				#!/bin/bash</a:t>
+            </a:r>
+            <a:endParaRPr lang="ru-RU" sz="1800" b="0" i="0" u="none" strike="noStrike" cap="none" spc="0">
+              <a:solidFill>
+                <a:schemeClr val="tx1"/>
+              </a:solidFill>
+              <a:latin typeface="Arial"/>
+              <a:cs typeface="Arial"/>
+            </a:endParaRPr>
+          </a:p>
+          <a:p>
+            <a:pPr marL="0" indent="0">
+              <a:buFont typeface="Arial"/>
+              <a:buNone/>
+              <a:defRPr/>
+            </a:pPr>
+            <a:r>
+              <a:rPr lang="ru-RU" sz="1800" b="0" i="0" u="none" strike="noStrike" cap="none" spc="0">
+                <a:solidFill>
+                  <a:schemeClr val="tx1"/>
+                </a:solidFill>
+                <a:latin typeface="Arial"/>
+                <a:ea typeface="Arial"/>
+                <a:cs typeface="Arial"/>
+              </a:rPr>
+              <a:t>				echo $0</a:t>
+            </a:r>
+            <a:endParaRPr lang="ru-RU" sz="1800" b="0" i="0" u="none" strike="noStrike" cap="none" spc="0">
+              <a:solidFill>
+                <a:schemeClr val="tx1"/>
+              </a:solidFill>
+              <a:latin typeface="Arial"/>
+              <a:cs typeface="Arial"/>
+            </a:endParaRPr>
+          </a:p>
+          <a:p>
+            <a:pPr marL="0" indent="0">
+              <a:buFont typeface="Arial"/>
+              <a:buNone/>
+              <a:defRPr/>
+            </a:pPr>
+            <a:r>
+              <a:rPr lang="ru-RU" sz="1800" b="0" i="0" u="none" strike="noStrike" cap="none" spc="0">
+                <a:solidFill>
+                  <a:schemeClr val="tx1"/>
+                </a:solidFill>
+                <a:latin typeface="Arial"/>
+                <a:ea typeface="Arial"/>
+                <a:cs typeface="Arial"/>
+              </a:rPr>
+              <a:t>				echo $1</a:t>
+            </a:r>
+            <a:endParaRPr lang="ru-RU" sz="1800" b="0" i="0" u="none" strike="noStrike" cap="none" spc="0">
+              <a:solidFill>
+                <a:schemeClr val="tx1"/>
+              </a:solidFill>
+              <a:latin typeface="Arial"/>
+              <a:cs typeface="Arial"/>
+            </a:endParaRPr>
+          </a:p>
+          <a:p>
+            <a:pPr marL="0" indent="0">
+              <a:buFont typeface="Arial"/>
+              <a:buNone/>
+              <a:defRPr/>
+            </a:pPr>
+            <a:r>
+              <a:rPr lang="ru-RU" sz="1800" b="0" i="0" u="none" strike="noStrike" cap="none" spc="0">
+                <a:solidFill>
+                  <a:schemeClr val="tx1"/>
+                </a:solidFill>
+                <a:latin typeface="Arial"/>
+                <a:ea typeface="Arial"/>
+                <a:cs typeface="Arial"/>
+              </a:rPr>
+              <a:t>				echo $2</a:t>
+            </a:r>
+            <a:endParaRPr sz="1800"/>
+          </a:p>
+        </p:txBody>
+      </p:sp>
+    </p:spTree>
+  </p:cSld>
+  <p:clrMapOvr>
+    <a:masterClrMapping/>
+  </p:clrMapOvr>
+  <mc:AlternateContent xmlns:mc="http://schemas.openxmlformats.org/markup-compatibility/2006">
+    <mc:Choice xmlns:p159="http://schemas.microsoft.com/office/powerpoint/2015/09/main" xmlns:p14="http://schemas.microsoft.com/office/powerpoint/2010/main" Requires="p159">
+      <p:transition p14:dur="2000" advClick="1"/>
+    </mc:Choice>
+    <mc:Fallback>
+      <p:transition advClick="1"/>
+    </mc:Fallback>
+  </mc:AlternateContent>
+</p:sld>
+</file>
+
+<file path=ppt/slides/slide3.xml><?xml version="1.0" encoding="utf-8"?>
+<p:sld xmlns:a="http://schemas.openxmlformats.org/drawingml/2006/main" xmlns:r="http://schemas.openxmlformats.org/officeDocument/2006/relationships" xmlns:p="http://schemas.openxmlformats.org/presentationml/2006/main" xmlns:m="http://schemas.openxmlformats.org/officeDocument/2006/math" xmlns:w="http://schemas.openxmlformats.org/wordprocessingml/2006/main" xmlns:mc="http://schemas.openxmlformats.org/markup-compatibility/2006" showMasterPhAnim="0" showMasterSp="1" show="1">
+  <p:cSld name="">
+    <p:spTree>
+      <p:nvGrpSpPr>
+        <p:cNvPr id="1" name=""/>
+        <p:cNvGrpSpPr/>
+        <p:nvPr/>
+      </p:nvGrpSpPr>
+      <p:grpSpPr bwMode="auto">
+        <a:xfrm>
+          <a:off x="0" y="0"/>
+          <a:ext cx="0" cy="0"/>
+          <a:chOff x="0" y="0"/>
+          <a:chExt cx="0" cy="0"/>
+        </a:xfrm>
+      </p:grpSpPr>
+      <p:sp>
+        <p:nvSpPr>
+          <p:cNvPr id="2146579769" name="Title 1"/>
+          <p:cNvSpPr>
+            <a:spLocks noGrp="1"/>
+          </p:cNvSpPr>
+          <p:nvPr>
+            <p:ph type="title"/>
+          </p:nvPr>
+        </p:nvSpPr>
+        <p:spPr bwMode="auto">
+          <a:xfrm flipH="0" flipV="0">
+            <a:off x="838197" y="365121"/>
+            <a:ext cx="10515600" cy="616833"/>
+          </a:xfrm>
+        </p:spPr>
+        <p:txBody>
+          <a:bodyPr vertOverflow="overflow" horzOverflow="overflow" vert="horz" wrap="square" lIns="91440" tIns="45720" rIns="91440" bIns="45720" numCol="1" spcCol="0" rtlCol="0" fromWordArt="0" anchor="ctr" anchorCtr="0" forceAA="0" upright="0" compatLnSpc="0">
+            <a:normAutofit/>
+          </a:bodyPr>
+          <a:lstStyle/>
+          <a:p>
+            <a:pPr>
+              <a:defRPr/>
+            </a:pPr>
+            <a:r>
+              <a:rPr sz="2400"/>
+              <a:t>Скрипты: параметры командной строки</a:t>
+            </a:r>
+            <a:endParaRPr sz="2400"/>
+          </a:p>
+        </p:txBody>
+      </p:sp>
+      <p:sp>
+        <p:nvSpPr>
+          <p:cNvPr id="1367155676" name="Content Placeholder 2"/>
+          <p:cNvSpPr>
+            <a:spLocks noGrp="1"/>
+          </p:cNvSpPr>
+          <p:nvPr>
+            <p:ph idx="1"/>
+          </p:nvPr>
+        </p:nvSpPr>
+        <p:spPr bwMode="auto">
+          <a:xfrm flipH="0" flipV="0">
+            <a:off x="838197" y="1109610"/>
+            <a:ext cx="10515600" cy="5371311"/>
+          </a:xfrm>
+        </p:spPr>
+        <p:txBody>
+          <a:bodyPr vertOverflow="overflow" horzOverflow="overflow" vert="horz" wrap="square" lIns="91440" tIns="45720" rIns="91440" bIns="45720" numCol="1" spcCol="0" rtlCol="0" fromWordArt="0" anchor="t" anchorCtr="0" forceAA="0" upright="0" compatLnSpc="0">
+            <a:normAutofit/>
+          </a:bodyPr>
+          <a:lstStyle/>
+          <a:p>
+            <a:pPr>
+              <a:defRPr/>
+            </a:pPr>
+            <a:r>
+              <a:rPr lang="ru-RU" sz="1800" b="0" i="0" u="none" strike="noStrike" cap="none" spc="0">
+                <a:solidFill>
+                  <a:schemeClr val="tx1"/>
+                </a:solidFill>
+                <a:latin typeface="Arial"/>
+                <a:ea typeface="Arial"/>
+                <a:cs typeface="Arial"/>
+              </a:rPr>
+              <a:t>$@</a:t>
+            </a:r>
+            <a:r>
+              <a:rPr sz="1800"/>
+              <a:t> – все аргументы в виде списка (не содержит имя программы)</a:t>
+            </a:r>
+            <a:endParaRPr sz="1800"/>
+          </a:p>
+          <a:p>
+            <a:pPr>
+              <a:defRPr/>
+            </a:pPr>
+            <a:r>
+              <a:rPr lang="ru-RU" sz="1800" b="0" i="0" u="none" strike="noStrike" cap="none" spc="0">
+                <a:solidFill>
+                  <a:schemeClr val="tx1"/>
+                </a:solidFill>
+                <a:latin typeface="Arial"/>
+                <a:ea typeface="Arial"/>
+                <a:cs typeface="Arial"/>
+              </a:rPr>
+              <a:t>$*</a:t>
+            </a:r>
+            <a:r>
+              <a:rPr sz="1800"/>
+              <a:t> – все аргументы в виде строки (</a:t>
+            </a:r>
+            <a:r>
+              <a:rPr lang="ru-RU" sz="1800" b="0" i="0" u="none" strike="noStrike" cap="none" spc="0">
+                <a:solidFill>
+                  <a:schemeClr val="tx1"/>
+                </a:solidFill>
+                <a:latin typeface="Arial"/>
+                <a:ea typeface="Arial"/>
+                <a:cs typeface="Arial"/>
+              </a:rPr>
+              <a:t>не содержит имя программы</a:t>
+            </a:r>
+            <a:r>
+              <a:rPr sz="1800"/>
+              <a:t>)</a:t>
+            </a:r>
+            <a:endParaRPr sz="1800"/>
+          </a:p>
+          <a:p>
+            <a:pPr>
+              <a:defRPr/>
+            </a:pPr>
+            <a:r>
+              <a:rPr sz="1800"/>
+              <a:t>$# – количество аргументов</a:t>
+            </a:r>
+            <a:endParaRPr sz="1800"/>
+          </a:p>
+          <a:p>
+            <a:pPr marL="0" indent="0">
+              <a:buFont typeface="Arial"/>
+              <a:buNone/>
+              <a:defRPr/>
+            </a:pPr>
+            <a:endParaRPr sz="1800"/>
+          </a:p>
+          <a:p>
+            <a:pPr marL="0" indent="0">
+              <a:buFont typeface="Arial"/>
+              <a:buNone/>
+              <a:defRPr/>
+            </a:pPr>
+            <a:r>
+              <a:rPr lang="ru-RU" sz="1800" b="0" i="0" u="none" strike="noStrike" cap="none" spc="0">
+                <a:solidFill>
+                  <a:schemeClr val="tx1"/>
+                </a:solidFill>
+                <a:latin typeface="Arial"/>
+                <a:ea typeface="Arial"/>
+                <a:cs typeface="Arial"/>
+              </a:rPr>
+              <a:t>			#!/bin/bash</a:t>
+            </a:r>
+            <a:endParaRPr lang="ru-RU" sz="1800" b="0" i="0" u="none" strike="noStrike" cap="none" spc="0">
+              <a:solidFill>
+                <a:schemeClr val="tx1"/>
+              </a:solidFill>
+              <a:latin typeface="Arial"/>
+              <a:cs typeface="Arial"/>
+            </a:endParaRPr>
+          </a:p>
+          <a:p>
+            <a:pPr marL="0" indent="0">
+              <a:buFont typeface="Arial"/>
+              <a:buNone/>
+              <a:defRPr/>
+            </a:pPr>
+            <a:r>
+              <a:rPr lang="ru-RU" sz="1800" b="0" i="0" u="none" strike="noStrike" cap="none" spc="0">
+                <a:solidFill>
+                  <a:schemeClr val="tx1"/>
+                </a:solidFill>
+                <a:latin typeface="Arial"/>
+                <a:ea typeface="Arial"/>
+                <a:cs typeface="Arial"/>
+              </a:rPr>
+              <a:t>			</a:t>
+            </a:r>
+            <a:r>
+              <a:rPr lang="ru-RU" sz="1800" b="0" i="0" u="none" strike="noStrike" cap="none" spc="0">
+                <a:solidFill>
+                  <a:schemeClr val="tx1"/>
+                </a:solidFill>
+                <a:latin typeface="Arial"/>
+                <a:ea typeface="Arial"/>
+                <a:cs typeface="Arial"/>
+              </a:rPr>
+              <a:t>echo "Все аргументы: $*"</a:t>
+            </a:r>
+            <a:endParaRPr lang="ru-RU" sz="1800" b="0" i="0" u="none" strike="noStrike" cap="none" spc="0">
+              <a:solidFill>
+                <a:schemeClr val="tx1"/>
+              </a:solidFill>
+              <a:latin typeface="Arial"/>
+              <a:cs typeface="Arial"/>
+            </a:endParaRPr>
+          </a:p>
+          <a:p>
+            <a:pPr marL="0" indent="0">
+              <a:buFont typeface="Arial"/>
+              <a:buNone/>
+              <a:defRPr/>
+            </a:pPr>
+            <a:r>
+              <a:rPr lang="ru-RU" sz="1800" b="0" i="0" u="none" strike="noStrike" cap="none" spc="0">
+                <a:solidFill>
+                  <a:schemeClr val="tx1"/>
+                </a:solidFill>
+                <a:latin typeface="Arial"/>
+                <a:ea typeface="Arial"/>
+                <a:cs typeface="Arial"/>
+              </a:rPr>
+              <a:t>			</a:t>
+            </a:r>
+            <a:r>
+              <a:rPr lang="ru-RU" sz="1800" b="0" i="0" u="none" strike="noStrike" cap="none" spc="0">
+                <a:solidFill>
+                  <a:schemeClr val="tx1"/>
+                </a:solidFill>
+                <a:latin typeface="Arial"/>
+                <a:ea typeface="Arial"/>
+                <a:cs typeface="Arial"/>
+              </a:rPr>
+              <a:t>echo "Всего аргументов: $#"</a:t>
+            </a:r>
+            <a:endParaRPr lang="ru-RU" sz="1800" b="0" i="0" u="none" strike="noStrike" cap="none" spc="0">
+              <a:solidFill>
+                <a:schemeClr val="tx1"/>
+              </a:solidFill>
+              <a:latin typeface="Arial"/>
+              <a:cs typeface="Arial"/>
+            </a:endParaRPr>
+          </a:p>
+          <a:p>
+            <a:pPr marL="0" indent="0">
+              <a:buFont typeface="Arial"/>
+              <a:buNone/>
+              <a:defRPr/>
+            </a:pPr>
+            <a:r>
+              <a:rPr lang="ru-RU" sz="1800" b="0" i="0" u="none" strike="noStrike" cap="none" spc="0">
+                <a:solidFill>
+                  <a:schemeClr val="tx1"/>
+                </a:solidFill>
+                <a:latin typeface="Arial"/>
+                <a:ea typeface="Arial"/>
+                <a:cs typeface="Arial"/>
+              </a:rPr>
+              <a:t>			</a:t>
+            </a:r>
+            <a:r>
+              <a:rPr lang="ru-RU" sz="1800" b="0" i="0" u="none" strike="noStrike" cap="none" spc="0">
+                <a:solidFill>
+                  <a:schemeClr val="tx1"/>
+                </a:solidFill>
+                <a:latin typeface="Arial"/>
+                <a:ea typeface="Arial"/>
+                <a:cs typeface="Arial"/>
+              </a:rPr>
+              <a:t>for arg in $@</a:t>
+            </a:r>
+            <a:endParaRPr lang="ru-RU" sz="1800" b="0" i="0" u="none" strike="noStrike" cap="none" spc="0">
+              <a:solidFill>
+                <a:schemeClr val="tx1"/>
+              </a:solidFill>
+              <a:latin typeface="Arial"/>
+              <a:cs typeface="Arial"/>
+            </a:endParaRPr>
+          </a:p>
+          <a:p>
+            <a:pPr marL="0" indent="0">
+              <a:buFont typeface="Arial"/>
+              <a:buNone/>
+              <a:defRPr/>
+            </a:pPr>
+            <a:r>
+              <a:rPr lang="ru-RU" sz="1800" b="0" i="0" u="none" strike="noStrike" cap="none" spc="0">
+                <a:solidFill>
+                  <a:schemeClr val="tx1"/>
+                </a:solidFill>
+                <a:latin typeface="Arial"/>
+                <a:ea typeface="Arial"/>
+                <a:cs typeface="Arial"/>
+              </a:rPr>
+              <a:t>			</a:t>
+            </a:r>
+            <a:r>
+              <a:rPr lang="ru-RU" sz="1800" b="0" i="0" u="none" strike="noStrike" cap="none" spc="0">
+                <a:solidFill>
+                  <a:schemeClr val="tx1"/>
+                </a:solidFill>
+                <a:latin typeface="Arial"/>
+                <a:ea typeface="Arial"/>
+                <a:cs typeface="Arial"/>
+              </a:rPr>
+              <a:t>do</a:t>
+            </a:r>
+            <a:endParaRPr lang="ru-RU" sz="1800" b="0" i="0" u="none" strike="noStrike" cap="none" spc="0">
+              <a:solidFill>
+                <a:schemeClr val="tx1"/>
+              </a:solidFill>
+              <a:latin typeface="Arial"/>
+              <a:cs typeface="Arial"/>
+            </a:endParaRPr>
+          </a:p>
+          <a:p>
+            <a:pPr marL="0" indent="0">
+              <a:buFont typeface="Arial"/>
+              <a:buNone/>
+              <a:defRPr/>
+            </a:pPr>
+            <a:r>
+              <a:rPr lang="ru-RU" sz="1800" b="0" i="0" u="none" strike="noStrike" cap="none" spc="0">
+                <a:solidFill>
+                  <a:schemeClr val="tx1"/>
+                </a:solidFill>
+                <a:latin typeface="Arial"/>
+                <a:ea typeface="Arial"/>
+                <a:cs typeface="Arial"/>
+              </a:rPr>
+              <a:t>			</a:t>
+            </a:r>
+            <a:r>
+              <a:rPr lang="ru-RU" sz="1800" b="0" i="0" u="none" strike="noStrike" cap="none" spc="0">
+                <a:solidFill>
+                  <a:schemeClr val="tx1"/>
+                </a:solidFill>
+                <a:latin typeface="Arial"/>
+                <a:ea typeface="Arial"/>
+                <a:cs typeface="Arial"/>
+              </a:rPr>
+              <a:t>	if [ -n $arg ]</a:t>
+            </a:r>
+            <a:endParaRPr lang="ru-RU" sz="1800" b="0" i="0" u="none" strike="noStrike" cap="none" spc="0">
+              <a:solidFill>
+                <a:schemeClr val="tx1"/>
+              </a:solidFill>
+              <a:latin typeface="Arial"/>
+              <a:cs typeface="Arial"/>
+            </a:endParaRPr>
+          </a:p>
+          <a:p>
+            <a:pPr marL="0" indent="0">
+              <a:buFont typeface="Arial"/>
+              <a:buNone/>
+              <a:defRPr/>
+            </a:pPr>
+            <a:r>
+              <a:rPr lang="ru-RU" sz="1800" b="0" i="0" u="none" strike="noStrike" cap="none" spc="0">
+                <a:solidFill>
+                  <a:schemeClr val="tx1"/>
+                </a:solidFill>
+                <a:latin typeface="Arial"/>
+                <a:ea typeface="Arial"/>
+                <a:cs typeface="Arial"/>
+              </a:rPr>
+              <a:t>			</a:t>
+            </a:r>
+            <a:r>
+              <a:rPr lang="ru-RU" sz="1800" b="0" i="0" u="none" strike="noStrike" cap="none" spc="0">
+                <a:solidFill>
+                  <a:schemeClr val="tx1"/>
+                </a:solidFill>
+                <a:latin typeface="Arial"/>
+                <a:ea typeface="Arial"/>
+                <a:cs typeface="Arial"/>
+              </a:rPr>
+              <a:t>	</a:t>
+            </a:r>
+            <a:r>
+              <a:rPr lang="ru-RU" sz="1800" b="0" i="0" u="none" strike="noStrike" cap="none" spc="0">
+                <a:solidFill>
+                  <a:schemeClr val="tx1"/>
+                </a:solidFill>
+                <a:latin typeface="Arial"/>
+                <a:ea typeface="Arial"/>
+                <a:cs typeface="Arial"/>
+              </a:rPr>
+              <a:t>then</a:t>
+            </a:r>
+            <a:endParaRPr lang="ru-RU" sz="1800" b="0" i="0" u="none" strike="noStrike" cap="none" spc="0">
+              <a:solidFill>
+                <a:schemeClr val="tx1"/>
+              </a:solidFill>
+              <a:latin typeface="Arial"/>
+              <a:cs typeface="Arial"/>
+            </a:endParaRPr>
+          </a:p>
+          <a:p>
+            <a:pPr marL="0" indent="0">
+              <a:buFont typeface="Arial"/>
+              <a:buNone/>
+              <a:defRPr/>
+            </a:pPr>
+            <a:r>
+              <a:rPr lang="ru-RU" sz="1800" b="0" i="0" u="none" strike="noStrike" cap="none" spc="0">
+                <a:solidFill>
+                  <a:schemeClr val="tx1"/>
+                </a:solidFill>
+                <a:latin typeface="Arial"/>
+                <a:ea typeface="Arial"/>
+                <a:cs typeface="Arial"/>
+              </a:rPr>
+              <a:t>			</a:t>
+            </a:r>
+            <a:r>
+              <a:rPr lang="ru-RU" sz="1800" b="0" i="0" u="none" strike="noStrike" cap="none" spc="0">
+                <a:solidFill>
+                  <a:schemeClr val="tx1"/>
+                </a:solidFill>
+                <a:latin typeface="Arial"/>
+                <a:ea typeface="Arial"/>
+                <a:cs typeface="Arial"/>
+              </a:rPr>
+              <a:t>	</a:t>
+            </a:r>
+            <a:r>
+              <a:rPr lang="ru-RU" sz="1800" b="0" i="0" u="none" strike="noStrike" cap="none" spc="0">
+                <a:solidFill>
+                  <a:schemeClr val="tx1"/>
+                </a:solidFill>
+                <a:latin typeface="Arial"/>
+                <a:ea typeface="Arial"/>
+                <a:cs typeface="Arial"/>
+              </a:rPr>
+              <a:t>	echo $arg</a:t>
+            </a:r>
+            <a:endParaRPr lang="ru-RU" sz="1800" b="0" i="0" u="none" strike="noStrike" cap="none" spc="0">
+              <a:solidFill>
+                <a:schemeClr val="tx1"/>
+              </a:solidFill>
+              <a:latin typeface="Arial"/>
+              <a:cs typeface="Arial"/>
+            </a:endParaRPr>
+          </a:p>
+          <a:p>
+            <a:pPr marL="0" indent="0">
+              <a:buFont typeface="Arial"/>
+              <a:buNone/>
+              <a:defRPr/>
+            </a:pPr>
+            <a:r>
+              <a:rPr lang="ru-RU" sz="1800" b="0" i="0" u="none" strike="noStrike" cap="none" spc="0">
+                <a:solidFill>
+                  <a:schemeClr val="tx1"/>
+                </a:solidFill>
+                <a:latin typeface="Arial"/>
+                <a:ea typeface="Arial"/>
+                <a:cs typeface="Arial"/>
+              </a:rPr>
+              <a:t>			</a:t>
+            </a:r>
+            <a:r>
+              <a:rPr lang="ru-RU" sz="1800" b="0" i="0" u="none" strike="noStrike" cap="none" spc="0">
+                <a:solidFill>
+                  <a:schemeClr val="tx1"/>
+                </a:solidFill>
+                <a:latin typeface="Arial"/>
+                <a:ea typeface="Arial"/>
+                <a:cs typeface="Arial"/>
+              </a:rPr>
+              <a:t>	</a:t>
+            </a:r>
+            <a:r>
+              <a:rPr lang="ru-RU" sz="1800" b="0" i="0" u="none" strike="noStrike" cap="none" spc="0">
+                <a:solidFill>
+                  <a:schemeClr val="tx1"/>
+                </a:solidFill>
+                <a:latin typeface="Arial"/>
+                <a:ea typeface="Arial"/>
+                <a:cs typeface="Arial"/>
+              </a:rPr>
+              <a:t>fi</a:t>
+            </a:r>
+            <a:endParaRPr lang="ru-RU" sz="1800" b="0" i="0" u="none" strike="noStrike" cap="none" spc="0">
+              <a:solidFill>
+                <a:schemeClr val="tx1"/>
+              </a:solidFill>
+              <a:latin typeface="Arial"/>
+              <a:cs typeface="Arial"/>
+            </a:endParaRPr>
+          </a:p>
+          <a:p>
+            <a:pPr marL="0" indent="0">
+              <a:buFont typeface="Arial"/>
+              <a:buNone/>
+              <a:defRPr/>
+            </a:pPr>
+            <a:r>
+              <a:rPr lang="ru-RU" sz="1800" b="0" i="0" u="none" strike="noStrike" cap="none" spc="0">
+                <a:solidFill>
+                  <a:schemeClr val="tx1"/>
+                </a:solidFill>
+                <a:latin typeface="Arial"/>
+                <a:ea typeface="Arial"/>
+                <a:cs typeface="Arial"/>
+              </a:rPr>
+              <a:t>			</a:t>
+            </a:r>
+            <a:r>
+              <a:rPr lang="ru-RU" sz="1800" b="0" i="0" u="none" strike="noStrike" cap="none" spc="0">
+                <a:solidFill>
+                  <a:schemeClr val="tx1"/>
+                </a:solidFill>
+                <a:latin typeface="Arial"/>
+                <a:ea typeface="Arial"/>
+                <a:cs typeface="Arial"/>
+              </a:rPr>
+              <a:t>done</a:t>
+            </a:r>
+            <a:endParaRPr sz="1800"/>
+          </a:p>
+        </p:txBody>
+      </p:sp>
+    </p:spTree>
+  </p:cSld>
+  <p:clrMapOvr>
+    <a:masterClrMapping/>
+  </p:clrMapOvr>
+  <mc:AlternateContent xmlns:mc="http://schemas.openxmlformats.org/markup-compatibility/2006">
+    <mc:Choice xmlns:p159="http://schemas.microsoft.com/office/powerpoint/2015/09/main" xmlns:p14="http://schemas.microsoft.com/office/powerpoint/2010/main" Requires="p159">
+      <p:transition p14:dur="2000" advClick="1"/>
+    </mc:Choice>
+    <mc:Fallback>
+      <p:transition advClick="1"/>
+    </mc:Fallback>
+  </mc:AlternateContent>
+</p:sld>
+</file>
+
+<file path=ppt/slides/slide4.xml><?xml version="1.0" encoding="utf-8"?>
+<p:sld xmlns:a="http://schemas.openxmlformats.org/drawingml/2006/main" xmlns:r="http://schemas.openxmlformats.org/officeDocument/2006/relationships" xmlns:p="http://schemas.openxmlformats.org/presentationml/2006/main" xmlns:m="http://schemas.openxmlformats.org/officeDocument/2006/math" xmlns:w="http://schemas.openxmlformats.org/wordprocessingml/2006/main" xmlns:mc="http://schemas.openxmlformats.org/markup-compatibility/2006" showMasterPhAnim="0" showMasterSp="1" show="1">
+  <p:cSld name="">
+    <p:spTree>
+      <p:nvGrpSpPr>
+        <p:cNvPr id="1" name=""/>
+        <p:cNvGrpSpPr/>
+        <p:nvPr/>
+      </p:nvGrpSpPr>
+      <p:grpSpPr bwMode="auto">
+        <a:xfrm>
+          <a:off x="0" y="0"/>
+          <a:ext cx="0" cy="0"/>
+          <a:chOff x="0" y="0"/>
+          <a:chExt cx="0" cy="0"/>
+        </a:xfrm>
+      </p:grpSpPr>
+      <p:sp>
+        <p:nvSpPr>
+          <p:cNvPr id="1775117818" name="Title 1"/>
+          <p:cNvSpPr>
+            <a:spLocks noGrp="1"/>
+          </p:cNvSpPr>
+          <p:nvPr>
+            <p:ph type="title"/>
+          </p:nvPr>
+        </p:nvSpPr>
+        <p:spPr bwMode="auto">
+          <a:xfrm flipH="0" flipV="0">
+            <a:off x="838197" y="365121"/>
+            <a:ext cx="10515600" cy="616833"/>
+          </a:xfrm>
+        </p:spPr>
+        <p:txBody>
+          <a:bodyPr vertOverflow="overflow" horzOverflow="overflow" vert="horz" wrap="square" lIns="91440" tIns="45720" rIns="91440" bIns="45720" numCol="1" spcCol="0" rtlCol="0" fromWordArt="0" anchor="ctr" anchorCtr="0" forceAA="0" upright="0" compatLnSpc="0">
+            <a:normAutofit/>
+          </a:bodyPr>
+          <a:lstStyle/>
+          <a:p>
+            <a:pPr>
+              <a:defRPr/>
+            </a:pPr>
+            <a:r>
+              <a:rPr sz="2400"/>
+              <a:t>Скрипты: параметры командной строки</a:t>
+            </a:r>
+            <a:endParaRPr sz="2400"/>
+          </a:p>
+        </p:txBody>
+      </p:sp>
+      <p:sp>
+        <p:nvSpPr>
+          <p:cNvPr id="147605945" name="Content Placeholder 2"/>
+          <p:cNvSpPr>
+            <a:spLocks noGrp="1"/>
+          </p:cNvSpPr>
+          <p:nvPr>
+            <p:ph idx="1"/>
+          </p:nvPr>
+        </p:nvSpPr>
+        <p:spPr bwMode="auto">
+          <a:xfrm flipH="0" flipV="0">
+            <a:off x="838197" y="1109610"/>
+            <a:ext cx="10515600" cy="5371311"/>
+          </a:xfrm>
+        </p:spPr>
+        <p:txBody>
+          <a:bodyPr vertOverflow="overflow" horzOverflow="overflow" vert="horz" wrap="square" lIns="91440" tIns="45720" rIns="91440" bIns="45720" numCol="1" spcCol="0" rtlCol="0" fromWordArt="0" anchor="t" anchorCtr="0" forceAA="0" upright="0" compatLnSpc="0">
+            <a:normAutofit/>
+          </a:bodyPr>
+          <a:lstStyle/>
+          <a:p>
+            <a:pPr marL="0" indent="0">
+              <a:buFont typeface="Arial"/>
+              <a:buNone/>
+              <a:defRPr/>
+            </a:pPr>
+            <a:r>
+              <a:rPr sz="1800"/>
+              <a:t>Задача: после ключа «-f» следующим аргументом будет идти имя файла. Необходимо вывести на экран содержимое этого файла.</a:t>
+            </a:r>
+            <a:endParaRPr sz="1800"/>
+          </a:p>
+          <a:p>
+            <a:pPr marL="0" indent="0">
+              <a:buFont typeface="Arial"/>
+              <a:buNone/>
+              <a:defRPr/>
+            </a:pPr>
+            <a:r>
+              <a:rPr sz="1800"/>
+              <a:t>			./script arg1 –f filename arg2</a:t>
+            </a:r>
+            <a:br>
+              <a:rPr sz="1800"/>
+            </a:br>
+            <a:br>
+              <a:rPr sz="1800"/>
+            </a:br>
+            <a:r>
+              <a:rPr sz="1800"/>
+              <a:t>Что нам понадобится:</a:t>
+            </a:r>
+            <a:endParaRPr sz="1800"/>
+          </a:p>
+          <a:p>
+            <a:pPr marL="283878" indent="-283878">
+              <a:buFont typeface="Arial"/>
+              <a:buAutoNum type="arabicPeriod"/>
+              <a:defRPr/>
+            </a:pPr>
+            <a:r>
+              <a:rPr sz="1800"/>
+              <a:t>$# – количество аргументов</a:t>
+            </a:r>
+            <a:endParaRPr sz="1800"/>
+          </a:p>
+          <a:p>
+            <a:pPr marL="283878" indent="-283878">
+              <a:buFont typeface="Arial"/>
+              <a:buAutoNum type="arabicPeriod"/>
+              <a:defRPr/>
+            </a:pPr>
+            <a:r>
+              <a:rPr sz="1800"/>
+              <a:t>Команда </a:t>
+            </a:r>
+            <a:r>
+              <a:rPr sz="1800" b="1"/>
+              <a:t>shift</a:t>
+            </a:r>
+            <a:r>
+              <a:rPr sz="1800" b="0"/>
+              <a:t>: </a:t>
+            </a:r>
+            <a:r>
+              <a:rPr lang="ru-RU" sz="1800" b="0" i="0" u="none" strike="noStrike" cap="none" spc="0">
+                <a:solidFill>
+                  <a:schemeClr val="tx1"/>
+                </a:solidFill>
+                <a:latin typeface="Arial"/>
+                <a:ea typeface="Arial"/>
+                <a:cs typeface="Arial"/>
+              </a:rPr>
+              <a:t>используется для сдвига позиционных параметров командной строки влево. </a:t>
+            </a:r>
+            <a:br>
+              <a:rPr lang="ru-RU" sz="1800" b="0" i="0" u="none" strike="noStrike" cap="none" spc="0">
+                <a:solidFill>
+                  <a:schemeClr val="tx1"/>
+                </a:solidFill>
+                <a:latin typeface="Arial"/>
+                <a:ea typeface="Arial"/>
+                <a:cs typeface="Arial"/>
+              </a:rPr>
+            </a:br>
+            <a:br>
+              <a:rPr lang="ru-RU" sz="1800" b="0" i="0" u="none" strike="noStrike" cap="none" spc="0">
+                <a:solidFill>
+                  <a:schemeClr val="tx1"/>
+                </a:solidFill>
+                <a:latin typeface="Arial"/>
+                <a:ea typeface="Arial"/>
+                <a:cs typeface="Arial"/>
+              </a:rPr>
+            </a:br>
+            <a:r>
+              <a:rPr lang="ru-RU" sz="1800" b="0" i="0" u="none" strike="noStrike" cap="none" spc="0">
+                <a:solidFill>
+                  <a:schemeClr val="tx1"/>
+                </a:solidFill>
+                <a:latin typeface="Arial"/>
+                <a:ea typeface="Arial"/>
+                <a:cs typeface="Arial"/>
+              </a:rPr>
+              <a:t>Это означает, что каждый аргумент перемещается на одну позицию назад, а первый аргумент удаляется. В результате $1 становится равным значению бывшего $2, $2 – значению бывшего $3 и так далее. </a:t>
+            </a:r>
+            <a:br>
+              <a:rPr lang="ru-RU" sz="1800" b="0" i="0" u="none" strike="noStrike" cap="none" spc="0">
+                <a:solidFill>
+                  <a:schemeClr val="tx1"/>
+                </a:solidFill>
+                <a:latin typeface="Arial"/>
+                <a:ea typeface="Arial"/>
+                <a:cs typeface="Arial"/>
+              </a:rPr>
+            </a:br>
+            <a:br>
+              <a:rPr lang="ru-RU" sz="1800" b="0" i="0" u="none" strike="noStrike" cap="none" spc="0">
+                <a:solidFill>
+                  <a:schemeClr val="tx1"/>
+                </a:solidFill>
+                <a:latin typeface="Arial"/>
+                <a:ea typeface="Arial"/>
+                <a:cs typeface="Arial"/>
+              </a:rPr>
+            </a:br>
+            <a:r>
+              <a:rPr lang="ru-RU" sz="1800" b="0" i="0" u="none" strike="noStrike" cap="none" spc="0">
+                <a:solidFill>
+                  <a:schemeClr val="tx1"/>
+                </a:solidFill>
+                <a:latin typeface="Arial"/>
+                <a:ea typeface="Arial"/>
+                <a:cs typeface="Arial"/>
+              </a:rPr>
+              <a:t>shift N – сдвиг аргументов на N позиций.</a:t>
+            </a:r>
+            <a:endParaRPr lang="ru-RU" sz="1800" b="0" i="0" u="none" strike="noStrike" cap="none" spc="0">
+              <a:solidFill>
+                <a:schemeClr val="tx1"/>
+              </a:solidFill>
+              <a:latin typeface="Arial"/>
+              <a:ea typeface="Arial"/>
+              <a:cs typeface="Arial"/>
+            </a:endParaRPr>
+          </a:p>
+          <a:p>
+            <a:pPr marL="283878" indent="-283878">
+              <a:buFont typeface="Arial"/>
+              <a:buAutoNum type="arabicPeriod"/>
+              <a:defRPr/>
+            </a:pPr>
+            <a:r>
+              <a:rPr lang="ru-RU" sz="1800" b="0" i="0" u="none" strike="noStrike" cap="none" spc="0">
+                <a:solidFill>
+                  <a:schemeClr val="tx1"/>
+                </a:solidFill>
+                <a:latin typeface="Arial"/>
+                <a:ea typeface="Arial"/>
+                <a:cs typeface="Arial"/>
+              </a:rPr>
+              <a:t>Ключ для проверки, что строка пустая: –z str</a:t>
+            </a:r>
+            <a:endParaRPr lang="ru-RU" sz="1800" b="0" i="0" u="none" strike="noStrike" cap="none" spc="0">
+              <a:solidFill>
+                <a:schemeClr val="tx1"/>
+              </a:solidFill>
+              <a:latin typeface="Arial"/>
+              <a:ea typeface="Arial"/>
+              <a:cs typeface="Arial"/>
+            </a:endParaRPr>
+          </a:p>
+          <a:p>
+            <a:pPr marL="283878" indent="-283878">
+              <a:buFont typeface="Arial"/>
+              <a:buAutoNum type="arabicPeriod"/>
+              <a:defRPr/>
+            </a:pPr>
+            <a:r>
+              <a:rPr lang="ru-RU" sz="1800" b="0" i="0" u="none" strike="noStrike" cap="none" spc="0">
+                <a:solidFill>
+                  <a:schemeClr val="tx1"/>
+                </a:solidFill>
+                <a:latin typeface="Arial"/>
+                <a:ea typeface="Arial"/>
+                <a:cs typeface="Arial"/>
+              </a:rPr>
+              <a:t>Команда преждевременного завершения скрипта: exit</a:t>
+            </a:r>
+            <a:endParaRPr lang="ru-RU" sz="1800"/>
+          </a:p>
+        </p:txBody>
+      </p:sp>
+    </p:spTree>
+  </p:cSld>
+  <p:clrMapOvr>
+    <a:masterClrMapping/>
+  </p:clrMapOvr>
+  <mc:AlternateContent xmlns:mc="http://schemas.openxmlformats.org/markup-compatibility/2006">
+    <mc:Choice xmlns:p159="http://schemas.microsoft.com/office/powerpoint/2015/09/main" xmlns:p14="http://schemas.microsoft.com/office/powerpoint/2010/main" Requires="p159">
+      <p:transition p14:dur="2000" advClick="1"/>
+    </mc:Choice>
+    <mc:Fallback>
+      <p:transition advClick="1"/>
+    </mc:Fallback>
+  </mc:AlternateContent>
+</p:sld>
+</file>
+
+<file path=ppt/slides/slide5.xml><?xml version="1.0" encoding="utf-8"?>
+<p:sld xmlns:a="http://schemas.openxmlformats.org/drawingml/2006/main" xmlns:r="http://schemas.openxmlformats.org/officeDocument/2006/relationships" xmlns:p="http://schemas.openxmlformats.org/presentationml/2006/main" xmlns:m="http://schemas.openxmlformats.org/officeDocument/2006/math" xmlns:w="http://schemas.openxmlformats.org/wordprocessingml/2006/main" xmlns:mc="http://schemas.openxmlformats.org/markup-compatibility/2006" showMasterPhAnim="0" showMasterSp="1" show="1">
+  <p:cSld name="">
+    <p:spTree>
+      <p:nvGrpSpPr>
+        <p:cNvPr id="1" name=""/>
+        <p:cNvGrpSpPr/>
+        <p:nvPr/>
+      </p:nvGrpSpPr>
+      <p:grpSpPr bwMode="auto">
+        <a:xfrm>
+          <a:off x="0" y="0"/>
+          <a:ext cx="0" cy="0"/>
+          <a:chOff x="0" y="0"/>
+          <a:chExt cx="0" cy="0"/>
+        </a:xfrm>
+      </p:grpSpPr>
+      <p:sp>
+        <p:nvSpPr>
+          <p:cNvPr id="757979051" name="Title 1"/>
+          <p:cNvSpPr>
+            <a:spLocks noGrp="1"/>
+          </p:cNvSpPr>
+          <p:nvPr>
+            <p:ph type="title"/>
+          </p:nvPr>
+        </p:nvSpPr>
+        <p:spPr bwMode="auto">
+          <a:xfrm flipH="0" flipV="0">
+            <a:off x="838197" y="365121"/>
+            <a:ext cx="10515600" cy="616833"/>
+          </a:xfrm>
+        </p:spPr>
+        <p:txBody>
+          <a:bodyPr vertOverflow="overflow" horzOverflow="overflow" vert="horz" wrap="square" lIns="91440" tIns="45720" rIns="91440" bIns="45720" numCol="1" spcCol="0" rtlCol="0" fromWordArt="0" anchor="ctr" anchorCtr="0" forceAA="0" upright="0" compatLnSpc="0">
+            <a:normAutofit/>
+          </a:bodyPr>
+          <a:lstStyle/>
+          <a:p>
+            <a:pPr>
+              <a:defRPr/>
+            </a:pPr>
+            <a:r>
+              <a:rPr sz="2400"/>
+              <a:t>Скрипты: параметры командной строки</a:t>
+            </a:r>
+            <a:endParaRPr sz="2400"/>
+          </a:p>
+        </p:txBody>
+      </p:sp>
+      <p:sp>
+        <p:nvSpPr>
+          <p:cNvPr id="520191549" name="Content Placeholder 2"/>
+          <p:cNvSpPr>
+            <a:spLocks noGrp="1"/>
+          </p:cNvSpPr>
+          <p:nvPr>
+            <p:ph idx="1"/>
+          </p:nvPr>
+        </p:nvSpPr>
+        <p:spPr bwMode="auto">
+          <a:xfrm flipH="0" flipV="0">
+            <a:off x="838197" y="1109610"/>
+            <a:ext cx="10515600" cy="5371311"/>
+          </a:xfrm>
+        </p:spPr>
+        <p:txBody>
+          <a:bodyPr vertOverflow="overflow" horzOverflow="overflow" vert="horz" wrap="square" lIns="91440" tIns="45720" rIns="91440" bIns="45720" numCol="2" spcCol="0" rtlCol="0" fromWordArt="0" anchor="t" anchorCtr="0" forceAA="0" upright="0" compatLnSpc="0">
+            <a:normAutofit/>
+          </a:bodyPr>
+          <a:lstStyle/>
+          <a:p>
+            <a:pPr marL="0" indent="0">
+              <a:buFont typeface="Arial"/>
+              <a:buNone/>
+              <a:defRPr/>
+            </a:pPr>
+            <a:r>
+              <a:rPr lang="ru-RU" sz="1800" b="0" i="0" u="none" strike="noStrike" cap="none" spc="0">
+                <a:solidFill>
+                  <a:schemeClr val="tx1"/>
+                </a:solidFill>
+                <a:latin typeface="Arial"/>
+                <a:ea typeface="Arial"/>
+                <a:cs typeface="Arial"/>
+              </a:rPr>
+              <a:t>#!/bin/bash</a:t>
+            </a:r>
+            <a:endParaRPr sz="2400" b="0" i="0" u="none" strike="noStrike" cap="none" spc="0">
+              <a:solidFill>
+                <a:schemeClr val="tx1"/>
+              </a:solidFill>
+              <a:latin typeface="Arial"/>
+              <a:cs typeface="Arial"/>
+            </a:endParaRPr>
+          </a:p>
+          <a:p>
+            <a:pPr marL="0" indent="0">
+              <a:buFont typeface="Arial"/>
+              <a:buNone/>
+              <a:defRPr/>
+            </a:pPr>
+            <a:r>
+              <a:rPr lang="ru-RU" sz="1800" b="0" i="0" u="none" strike="noStrike" cap="none" spc="0">
+                <a:solidFill>
+                  <a:schemeClr val="tx1"/>
+                </a:solidFill>
+                <a:latin typeface="Arial"/>
+                <a:ea typeface="Arial"/>
+                <a:cs typeface="Arial"/>
+              </a:rPr>
+              <a:t>filename=""</a:t>
+            </a:r>
+            <a:endParaRPr sz="2400" b="0" i="0" u="none" strike="noStrike" cap="none" spc="0">
+              <a:solidFill>
+                <a:schemeClr val="tx1"/>
+              </a:solidFill>
+              <a:latin typeface="Arial"/>
+              <a:cs typeface="Arial"/>
+            </a:endParaRPr>
+          </a:p>
+          <a:p>
+            <a:pPr marL="0" indent="0">
+              <a:buFont typeface="Arial"/>
+              <a:buNone/>
+              <a:defRPr/>
+            </a:pPr>
+            <a:r>
+              <a:rPr lang="ru-RU" sz="1800" b="0" i="0" u="none" strike="noStrike" cap="none" spc="0">
+                <a:solidFill>
+                  <a:schemeClr val="tx1"/>
+                </a:solidFill>
+                <a:latin typeface="Arial"/>
+                <a:ea typeface="Arial"/>
+                <a:cs typeface="Arial"/>
+              </a:rPr>
+              <a:t>while [ $# \&gt; 0 ] </a:t>
+            </a:r>
+            <a:endParaRPr sz="2400" b="0" i="0" u="none" strike="noStrike" cap="none" spc="0">
+              <a:solidFill>
+                <a:schemeClr val="tx1"/>
+              </a:solidFill>
+              <a:latin typeface="Arial"/>
+              <a:cs typeface="Arial"/>
+            </a:endParaRPr>
+          </a:p>
+          <a:p>
+            <a:pPr marL="0" indent="0">
+              <a:buFont typeface="Arial"/>
+              <a:buNone/>
+              <a:defRPr/>
+            </a:pPr>
+            <a:r>
+              <a:rPr lang="ru-RU" sz="1800" b="0" i="0" u="none" strike="noStrike" cap="none" spc="0">
+                <a:solidFill>
+                  <a:schemeClr val="tx1"/>
+                </a:solidFill>
+                <a:latin typeface="Arial"/>
+                <a:ea typeface="Arial"/>
+                <a:cs typeface="Arial"/>
+              </a:rPr>
+              <a:t>do</a:t>
+            </a:r>
+            <a:endParaRPr sz="2400" b="0" i="0" u="none" strike="noStrike" cap="none" spc="0">
+              <a:solidFill>
+                <a:schemeClr val="tx1"/>
+              </a:solidFill>
+              <a:latin typeface="Arial"/>
+              <a:cs typeface="Arial"/>
+            </a:endParaRPr>
+          </a:p>
+          <a:p>
+            <a:pPr marL="0" indent="0">
+              <a:buFont typeface="Arial"/>
+              <a:buNone/>
+              <a:defRPr/>
+            </a:pPr>
+            <a:r>
+              <a:rPr lang="ru-RU" sz="1800" b="0" i="0" u="none" strike="noStrike" cap="none" spc="0">
+                <a:solidFill>
+                  <a:schemeClr val="tx1"/>
+                </a:solidFill>
+                <a:latin typeface="Arial"/>
+                <a:ea typeface="Arial"/>
+                <a:cs typeface="Arial"/>
+              </a:rPr>
+              <a:t>    if [ $1 == "-f" ]</a:t>
+            </a:r>
+            <a:endParaRPr sz="2400" b="0" i="0" u="none" strike="noStrike" cap="none" spc="0">
+              <a:solidFill>
+                <a:schemeClr val="tx1"/>
+              </a:solidFill>
+              <a:latin typeface="Arial"/>
+              <a:cs typeface="Arial"/>
+            </a:endParaRPr>
+          </a:p>
+          <a:p>
+            <a:pPr marL="0" indent="0">
+              <a:buFont typeface="Arial"/>
+              <a:buNone/>
+              <a:defRPr/>
+            </a:pPr>
+            <a:r>
+              <a:rPr lang="ru-RU" sz="1800" b="0" i="0" u="none" strike="noStrike" cap="none" spc="0">
+                <a:solidFill>
+                  <a:schemeClr val="tx1"/>
+                </a:solidFill>
+                <a:latin typeface="Arial"/>
+                <a:ea typeface="Arial"/>
+                <a:cs typeface="Arial"/>
+              </a:rPr>
+              <a:t>    then</a:t>
+            </a:r>
+            <a:endParaRPr sz="2400" b="0" i="0" u="none" strike="noStrike" cap="none" spc="0">
+              <a:solidFill>
+                <a:schemeClr val="tx1"/>
+              </a:solidFill>
+              <a:latin typeface="Arial"/>
+              <a:cs typeface="Arial"/>
+            </a:endParaRPr>
+          </a:p>
+          <a:p>
+            <a:pPr marL="0" indent="0">
+              <a:buFont typeface="Arial"/>
+              <a:buNone/>
+              <a:defRPr/>
+            </a:pPr>
+            <a:r>
+              <a:rPr lang="ru-RU" sz="1800" b="0" i="0" u="none" strike="noStrike" cap="none" spc="0">
+                <a:solidFill>
+                  <a:schemeClr val="tx1"/>
+                </a:solidFill>
+                <a:latin typeface="Arial"/>
+                <a:ea typeface="Arial"/>
+                <a:cs typeface="Arial"/>
+              </a:rPr>
+              <a:t>            filename="$2"</a:t>
+            </a:r>
+            <a:endParaRPr sz="2400" b="0" i="0" u="none" strike="noStrike" cap="none" spc="0">
+              <a:solidFill>
+                <a:schemeClr val="tx1"/>
+              </a:solidFill>
+              <a:latin typeface="Arial"/>
+              <a:cs typeface="Arial"/>
+            </a:endParaRPr>
+          </a:p>
+          <a:p>
+            <a:pPr marL="0" indent="0">
+              <a:buFont typeface="Arial"/>
+              <a:buNone/>
+              <a:defRPr/>
+            </a:pPr>
+            <a:r>
+              <a:rPr lang="ru-RU" sz="1800" b="0" i="0" u="none" strike="noStrike" cap="none" spc="0">
+                <a:solidFill>
+                  <a:schemeClr val="tx1"/>
+                </a:solidFill>
+                <a:latin typeface="Arial"/>
+                <a:ea typeface="Arial"/>
+                <a:cs typeface="Arial"/>
+              </a:rPr>
+              <a:t>            break</a:t>
+            </a:r>
+            <a:endParaRPr sz="2400" b="0" i="0" u="none" strike="noStrike" cap="none" spc="0">
+              <a:solidFill>
+                <a:schemeClr val="tx1"/>
+              </a:solidFill>
+              <a:latin typeface="Arial"/>
+              <a:cs typeface="Arial"/>
+            </a:endParaRPr>
+          </a:p>
+          <a:p>
+            <a:pPr marL="0" indent="0">
+              <a:buFont typeface="Arial"/>
+              <a:buNone/>
+              <a:defRPr/>
+            </a:pPr>
+            <a:r>
+              <a:rPr lang="ru-RU" sz="1800" b="0" i="0" u="none" strike="noStrike" cap="none" spc="0">
+                <a:solidFill>
+                  <a:schemeClr val="tx1"/>
+                </a:solidFill>
+                <a:latin typeface="Arial"/>
+                <a:ea typeface="Arial"/>
+                <a:cs typeface="Arial"/>
+              </a:rPr>
+              <a:t>    else</a:t>
+            </a:r>
+            <a:endParaRPr sz="2400" b="0" i="0" u="none" strike="noStrike" cap="none" spc="0">
+              <a:solidFill>
+                <a:schemeClr val="tx1"/>
+              </a:solidFill>
+              <a:latin typeface="Arial"/>
+              <a:cs typeface="Arial"/>
+            </a:endParaRPr>
+          </a:p>
+          <a:p>
+            <a:pPr marL="0" indent="0">
+              <a:buFont typeface="Arial"/>
+              <a:buNone/>
+              <a:defRPr/>
+            </a:pPr>
+            <a:r>
+              <a:rPr lang="ru-RU" sz="1800" b="0" i="0" u="none" strike="noStrike" cap="none" spc="0">
+                <a:solidFill>
+                  <a:schemeClr val="tx1"/>
+                </a:solidFill>
+                <a:latin typeface="Arial"/>
+                <a:ea typeface="Arial"/>
+                <a:cs typeface="Arial"/>
+              </a:rPr>
+              <a:t>        </a:t>
+            </a:r>
+            <a:r>
+              <a:rPr lang="ru-RU" sz="1800" b="1" i="0" u="none" strike="noStrike" cap="none" spc="0">
+                <a:solidFill>
+                  <a:schemeClr val="tx1"/>
+                </a:solidFill>
+                <a:latin typeface="Arial"/>
+                <a:ea typeface="Arial"/>
+                <a:cs typeface="Arial"/>
+              </a:rPr>
+              <a:t>shift</a:t>
+            </a:r>
+            <a:endParaRPr sz="2400" b="0" i="0" u="none" strike="noStrike" cap="none" spc="0">
+              <a:solidFill>
+                <a:schemeClr val="tx1"/>
+              </a:solidFill>
+              <a:latin typeface="Arial"/>
+              <a:cs typeface="Arial"/>
+            </a:endParaRPr>
+          </a:p>
+          <a:p>
+            <a:pPr marL="0" indent="0">
+              <a:buFont typeface="Arial"/>
+              <a:buNone/>
+              <a:defRPr/>
+            </a:pPr>
+            <a:r>
+              <a:rPr lang="ru-RU" sz="1800" b="0" i="0" u="none" strike="noStrike" cap="none" spc="0">
+                <a:solidFill>
+                  <a:schemeClr val="tx1"/>
+                </a:solidFill>
+                <a:latin typeface="Arial"/>
+                <a:ea typeface="Arial"/>
+                <a:cs typeface="Arial"/>
+              </a:rPr>
+              <a:t>    fi</a:t>
+            </a:r>
+            <a:endParaRPr sz="2400" b="0" i="0" u="none" strike="noStrike" cap="none" spc="0">
+              <a:solidFill>
+                <a:schemeClr val="tx1"/>
+              </a:solidFill>
+              <a:latin typeface="Arial"/>
+              <a:cs typeface="Arial"/>
+            </a:endParaRPr>
+          </a:p>
+          <a:p>
+            <a:pPr marL="0" indent="0">
+              <a:buFont typeface="Arial"/>
+              <a:buNone/>
+              <a:defRPr/>
+            </a:pPr>
+            <a:r>
+              <a:rPr lang="ru-RU" sz="1800" b="0" i="0" u="none" strike="noStrike" cap="none" spc="0">
+                <a:solidFill>
+                  <a:schemeClr val="tx1"/>
+                </a:solidFill>
+                <a:latin typeface="Arial"/>
+                <a:ea typeface="Arial"/>
+                <a:cs typeface="Arial"/>
+              </a:rPr>
+              <a:t>done</a:t>
+            </a:r>
+            <a:endParaRPr sz="2400" b="0" i="0" u="none" strike="noStrike" cap="none" spc="0">
+              <a:solidFill>
+                <a:schemeClr val="tx1"/>
+              </a:solidFill>
+              <a:latin typeface="Arial"/>
+              <a:cs typeface="Arial"/>
+            </a:endParaRPr>
+          </a:p>
+          <a:p>
+            <a:pPr marL="0" indent="0">
+              <a:buFont typeface="Arial"/>
+              <a:buNone/>
+              <a:defRPr/>
+            </a:pPr>
+            <a:endParaRPr sz="1800" b="0" i="0" u="none" strike="noStrike" cap="none" spc="0">
+              <a:solidFill>
+                <a:schemeClr val="tx1"/>
+              </a:solidFill>
+              <a:latin typeface="Arial"/>
+              <a:cs typeface="Arial"/>
+            </a:endParaRPr>
+          </a:p>
+          <a:p>
+            <a:pPr marL="0" indent="0">
+              <a:buFont typeface="Arial"/>
+              <a:buNone/>
+              <a:defRPr/>
+            </a:pPr>
+            <a:endParaRPr sz="1800" b="0" i="0" u="none" strike="noStrike" cap="none" spc="0">
+              <a:solidFill>
+                <a:schemeClr val="tx1"/>
+              </a:solidFill>
+              <a:latin typeface="Arial"/>
+              <a:cs typeface="Arial"/>
+            </a:endParaRPr>
+          </a:p>
+          <a:p>
+            <a:pPr marL="0" indent="0">
+              <a:buFont typeface="Arial"/>
+              <a:buNone/>
+              <a:defRPr/>
+            </a:pPr>
+            <a:r>
+              <a:rPr lang="ru-RU" sz="1800" b="0" i="0" u="none" strike="noStrike" cap="none" spc="0">
+                <a:solidFill>
+                  <a:schemeClr val="tx1"/>
+                </a:solidFill>
+                <a:latin typeface="Arial"/>
+                <a:ea typeface="Arial"/>
+                <a:cs typeface="Arial"/>
+              </a:rPr>
+              <a:t>if [ </a:t>
+            </a:r>
+            <a:r>
+              <a:rPr lang="ru-RU" sz="1800" b="1" i="0" u="none" strike="noStrike" cap="none" spc="0">
+                <a:solidFill>
+                  <a:schemeClr val="tx1"/>
+                </a:solidFill>
+                <a:latin typeface="Arial"/>
+                <a:ea typeface="Arial"/>
+                <a:cs typeface="Arial"/>
+              </a:rPr>
+              <a:t>-z</a:t>
+            </a:r>
+            <a:r>
+              <a:rPr lang="ru-RU" sz="1800" b="0" i="0" u="none" strike="noStrike" cap="none" spc="0">
+                <a:solidFill>
+                  <a:schemeClr val="tx1"/>
+                </a:solidFill>
+                <a:latin typeface="Arial"/>
+                <a:ea typeface="Arial"/>
+                <a:cs typeface="Arial"/>
+              </a:rPr>
+              <a:t> $filename ]</a:t>
+            </a:r>
+            <a:endParaRPr sz="1800" b="0" i="0" u="none" strike="noStrike" cap="none" spc="0">
+              <a:solidFill>
+                <a:schemeClr val="tx1"/>
+              </a:solidFill>
+              <a:latin typeface="Arial"/>
+              <a:cs typeface="Arial"/>
+            </a:endParaRPr>
+          </a:p>
+          <a:p>
+            <a:pPr marL="0" indent="0">
+              <a:buFont typeface="Arial"/>
+              <a:buNone/>
+              <a:defRPr/>
+            </a:pPr>
+            <a:r>
+              <a:rPr lang="ru-RU" sz="1800" b="0" i="0" u="none" strike="noStrike" cap="none" spc="0">
+                <a:solidFill>
+                  <a:schemeClr val="tx1"/>
+                </a:solidFill>
+                <a:latin typeface="Arial"/>
+                <a:ea typeface="Arial"/>
+                <a:cs typeface="Arial"/>
+              </a:rPr>
+              <a:t>then</a:t>
+            </a:r>
+            <a:endParaRPr sz="1800" b="0" i="0" u="none" strike="noStrike" cap="none" spc="0">
+              <a:solidFill>
+                <a:schemeClr val="tx1"/>
+              </a:solidFill>
+              <a:latin typeface="Arial"/>
+              <a:cs typeface="Arial"/>
+            </a:endParaRPr>
+          </a:p>
+          <a:p>
+            <a:pPr marL="0" indent="0">
+              <a:buFont typeface="Arial"/>
+              <a:buNone/>
+              <a:defRPr/>
+            </a:pPr>
+            <a:r>
+              <a:rPr lang="ru-RU" sz="1800" b="0" i="0" u="none" strike="noStrike" cap="none" spc="0">
+                <a:solidFill>
+                  <a:schemeClr val="tx1"/>
+                </a:solidFill>
+                <a:latin typeface="Arial"/>
+                <a:ea typeface="Arial"/>
+                <a:cs typeface="Arial"/>
+              </a:rPr>
+              <a:t>        echo "Имя файла не указано"</a:t>
+            </a:r>
+            <a:endParaRPr sz="1800" b="0" i="0" u="none" strike="noStrike" cap="none" spc="0">
+              <a:solidFill>
+                <a:schemeClr val="tx1"/>
+              </a:solidFill>
+              <a:latin typeface="Arial"/>
+              <a:cs typeface="Arial"/>
+            </a:endParaRPr>
+          </a:p>
+          <a:p>
+            <a:pPr marL="0" indent="0">
+              <a:buFont typeface="Arial"/>
+              <a:buNone/>
+              <a:defRPr/>
+            </a:pPr>
+            <a:r>
+              <a:rPr lang="ru-RU" sz="1800" b="0" i="0" u="none" strike="noStrike" cap="none" spc="0">
+                <a:solidFill>
+                  <a:schemeClr val="tx1"/>
+                </a:solidFill>
+                <a:latin typeface="Arial"/>
+                <a:ea typeface="Arial"/>
+                <a:cs typeface="Arial"/>
+              </a:rPr>
+              <a:t>        exit 1</a:t>
+            </a:r>
+            <a:endParaRPr sz="1800" b="0" i="0" u="none" strike="noStrike" cap="none" spc="0">
+              <a:solidFill>
+                <a:schemeClr val="tx1"/>
+              </a:solidFill>
+              <a:latin typeface="Arial"/>
+              <a:cs typeface="Arial"/>
+            </a:endParaRPr>
+          </a:p>
+          <a:p>
+            <a:pPr marL="0" indent="0">
+              <a:buFont typeface="Arial"/>
+              <a:buNone/>
+              <a:defRPr/>
+            </a:pPr>
+            <a:r>
+              <a:rPr lang="ru-RU" sz="1800" b="0" i="0" u="none" strike="noStrike" cap="none" spc="0">
+                <a:solidFill>
+                  <a:schemeClr val="tx1"/>
+                </a:solidFill>
+                <a:latin typeface="Arial"/>
+                <a:ea typeface="Arial"/>
+                <a:cs typeface="Arial"/>
+              </a:rPr>
+              <a:t>fi</a:t>
+            </a:r>
+            <a:endParaRPr lang="ru-RU" sz="1800" b="0" i="0" u="none" strike="noStrike" cap="none" spc="0">
+              <a:solidFill>
+                <a:schemeClr val="tx1"/>
+              </a:solidFill>
+              <a:latin typeface="Arial"/>
+              <a:ea typeface="Arial"/>
+              <a:cs typeface="Arial"/>
+            </a:endParaRPr>
+          </a:p>
+          <a:p>
+            <a:pPr marL="0" indent="0">
+              <a:buFont typeface="Arial"/>
+              <a:buNone/>
+              <a:defRPr/>
+            </a:pPr>
+            <a:endParaRPr lang="ru-RU" sz="1800" b="0" i="0" u="none" strike="noStrike" cap="none" spc="0">
+              <a:solidFill>
+                <a:schemeClr val="tx1"/>
+              </a:solidFill>
+              <a:latin typeface="Arial"/>
+              <a:cs typeface="Arial"/>
+            </a:endParaRPr>
+          </a:p>
+          <a:p>
+            <a:pPr marL="0" indent="0">
+              <a:buFont typeface="Arial"/>
+              <a:buNone/>
+              <a:defRPr/>
+            </a:pPr>
+            <a:r>
+              <a:rPr lang="ru-RU" sz="1800" b="0" i="0" u="none" strike="noStrike" cap="none" spc="0">
+                <a:solidFill>
+                  <a:schemeClr val="tx1"/>
+                </a:solidFill>
+                <a:latin typeface="Arial"/>
+                <a:ea typeface="Arial"/>
+                <a:cs typeface="Arial"/>
+              </a:rPr>
+              <a:t>if [ </a:t>
+            </a:r>
+            <a:r>
+              <a:rPr lang="ru-RU" sz="1800" b="1" i="0" u="none" strike="noStrike" cap="none" spc="0">
+                <a:solidFill>
+                  <a:schemeClr val="tx1"/>
+                </a:solidFill>
+                <a:latin typeface="Arial"/>
+                <a:ea typeface="Arial"/>
+                <a:cs typeface="Arial"/>
+              </a:rPr>
+              <a:t>-f</a:t>
+            </a:r>
+            <a:r>
+              <a:rPr lang="ru-RU" sz="1800" b="0" i="0" u="none" strike="noStrike" cap="none" spc="0">
+                <a:solidFill>
+                  <a:schemeClr val="tx1"/>
+                </a:solidFill>
+                <a:latin typeface="Arial"/>
+                <a:ea typeface="Arial"/>
+                <a:cs typeface="Arial"/>
+              </a:rPr>
+              <a:t> $filename ]</a:t>
+            </a:r>
+            <a:endParaRPr sz="1800" b="0" i="0" u="none" strike="noStrike" cap="none" spc="0">
+              <a:solidFill>
+                <a:schemeClr val="tx1"/>
+              </a:solidFill>
+              <a:latin typeface="Arial"/>
+              <a:cs typeface="Arial"/>
+            </a:endParaRPr>
+          </a:p>
+          <a:p>
+            <a:pPr marL="0" indent="0">
+              <a:buFont typeface="Arial"/>
+              <a:buNone/>
+              <a:defRPr/>
+            </a:pPr>
+            <a:r>
+              <a:rPr lang="ru-RU" sz="1800" b="0" i="0" u="none" strike="noStrike" cap="none" spc="0">
+                <a:solidFill>
+                  <a:schemeClr val="tx1"/>
+                </a:solidFill>
+                <a:latin typeface="Arial"/>
+                <a:ea typeface="Arial"/>
+                <a:cs typeface="Arial"/>
+              </a:rPr>
+              <a:t>then</a:t>
+            </a:r>
+            <a:endParaRPr sz="1800" b="0" i="0" u="none" strike="noStrike" cap="none" spc="0">
+              <a:solidFill>
+                <a:schemeClr val="tx1"/>
+              </a:solidFill>
+              <a:latin typeface="Arial"/>
+              <a:cs typeface="Arial"/>
+            </a:endParaRPr>
+          </a:p>
+          <a:p>
+            <a:pPr marL="0" indent="0">
+              <a:buFont typeface="Arial"/>
+              <a:buNone/>
+              <a:defRPr/>
+            </a:pPr>
+            <a:r>
+              <a:rPr lang="ru-RU" sz="1800" b="0" i="0" u="none" strike="noStrike" cap="none" spc="0">
+                <a:solidFill>
+                  <a:schemeClr val="tx1"/>
+                </a:solidFill>
+                <a:latin typeface="Arial"/>
+                <a:ea typeface="Arial"/>
+                <a:cs typeface="Arial"/>
+              </a:rPr>
+              <a:t>        cat $filename</a:t>
+            </a:r>
+            <a:endParaRPr sz="1800" b="0" i="0" u="none" strike="noStrike" cap="none" spc="0">
+              <a:solidFill>
+                <a:schemeClr val="tx1"/>
+              </a:solidFill>
+              <a:latin typeface="Arial"/>
+              <a:cs typeface="Arial"/>
+            </a:endParaRPr>
+          </a:p>
+          <a:p>
+            <a:pPr marL="0" indent="0">
+              <a:buFont typeface="Arial"/>
+              <a:buNone/>
+              <a:defRPr/>
+            </a:pPr>
+            <a:r>
+              <a:rPr lang="ru-RU" sz="1800" b="0" i="0" u="none" strike="noStrike" cap="none" spc="0">
+                <a:solidFill>
+                  <a:schemeClr val="tx1"/>
+                </a:solidFill>
+                <a:latin typeface="Arial"/>
+                <a:ea typeface="Arial"/>
+                <a:cs typeface="Arial"/>
+              </a:rPr>
+              <a:t>else</a:t>
+            </a:r>
+            <a:endParaRPr sz="1800" b="0" i="0" u="none" strike="noStrike" cap="none" spc="0">
+              <a:solidFill>
+                <a:schemeClr val="tx1"/>
+              </a:solidFill>
+              <a:latin typeface="Arial"/>
+              <a:cs typeface="Arial"/>
+            </a:endParaRPr>
+          </a:p>
+          <a:p>
+            <a:pPr marL="0" indent="0">
+              <a:buFont typeface="Arial"/>
+              <a:buNone/>
+              <a:defRPr/>
+            </a:pPr>
+            <a:r>
+              <a:rPr lang="ru-RU" sz="1800" b="0" i="0" u="none" strike="noStrike" cap="none" spc="0">
+                <a:solidFill>
+                  <a:schemeClr val="tx1"/>
+                </a:solidFill>
+                <a:latin typeface="Arial"/>
+                <a:ea typeface="Arial"/>
+                <a:cs typeface="Arial"/>
+              </a:rPr>
+              <a:t>        echo "Файл не существует"</a:t>
+            </a:r>
+            <a:endParaRPr sz="1800" b="0" i="0" u="none" strike="noStrike" cap="none" spc="0">
+              <a:solidFill>
+                <a:schemeClr val="tx1"/>
+              </a:solidFill>
+              <a:latin typeface="Arial"/>
+              <a:cs typeface="Arial"/>
+            </a:endParaRPr>
+          </a:p>
+          <a:p>
+            <a:pPr marL="0" indent="0">
+              <a:buFont typeface="Arial"/>
+              <a:buNone/>
+              <a:defRPr/>
+            </a:pPr>
+            <a:r>
+              <a:rPr lang="ru-RU" sz="1800" b="0" i="0" u="none" strike="noStrike" cap="none" spc="0">
+                <a:solidFill>
+                  <a:schemeClr val="tx1"/>
+                </a:solidFill>
+                <a:latin typeface="Arial"/>
+                <a:ea typeface="Arial"/>
+                <a:cs typeface="Arial"/>
+              </a:rPr>
+              <a:t>fi</a:t>
+            </a:r>
+            <a:endParaRPr sz="1800"/>
           </a:p>
         </p:txBody>
       </p:sp>

</xml_diff>